<commit_message>
TRC 07 neue Lizenzen eingepflegt
</commit_message>
<xml_diff>
--- a/training-cards/music moves/Training Cards (TRC)/ger/apprentice/ger_TCR_07_Finalisieren_MM_A.pptx
+++ b/training-cards/music moves/Training Cards (TRC)/ger/apprentice/ger_TCR_07_Finalisieren_MM_A.pptx
@@ -105,6 +105,22 @@
       </a:defRPr>
     </a:lvl9pPr>
   </p:defaultTextStyle>
+  <p:extLst>
+    <p:ext uri="{EFAFB233-063F-42B5-8137-9DF3F51BA10A}">
+      <p15:sldGuideLst xmlns:p15="http://schemas.microsoft.com/office/powerpoint/2012/main">
+        <p15:guide id="1" orient="horz" pos="652">
+          <p15:clr>
+            <a:srgbClr val="A4A3A4"/>
+          </p15:clr>
+        </p15:guide>
+        <p15:guide id="2">
+          <p15:clr>
+            <a:srgbClr val="A4A3A4"/>
+          </p15:clr>
+        </p15:guide>
+      </p15:sldGuideLst>
+    </p:ext>
+  </p:extLst>
 </p:presentation>
 </file>
 
@@ -153,10 +169,9 @@
           </a:lstStyle>
           <a:p>
             <a:r>
-              <a:rPr lang="de-DE" dirty="0" smtClean="0"/>
+              <a:rPr lang="de-DE" dirty="0"/>
               <a:t>TITEL HINZUFÜGEN</a:t>
             </a:r>
-            <a:endParaRPr lang="de-DE" dirty="0"/>
           </a:p>
         </p:txBody>
       </p:sp>
@@ -187,35 +202,35 @@
           <a:p>
             <a:pPr lvl="0"/>
             <a:r>
-              <a:rPr lang="de-DE" smtClean="0"/>
+              <a:rPr lang="de-DE"/>
               <a:t>Mastertextformat bearbeiten</a:t>
             </a:r>
           </a:p>
           <a:p>
             <a:pPr lvl="1"/>
             <a:r>
-              <a:rPr lang="de-DE" smtClean="0"/>
+              <a:rPr lang="de-DE"/>
               <a:t>Zweite Ebene</a:t>
             </a:r>
           </a:p>
           <a:p>
             <a:pPr lvl="2"/>
             <a:r>
-              <a:rPr lang="de-DE" smtClean="0"/>
+              <a:rPr lang="de-DE"/>
               <a:t>Dritte Ebene</a:t>
             </a:r>
           </a:p>
           <a:p>
             <a:pPr lvl="3"/>
             <a:r>
-              <a:rPr lang="de-DE" smtClean="0"/>
+              <a:rPr lang="de-DE"/>
               <a:t>Vierte Ebene</a:t>
             </a:r>
           </a:p>
           <a:p>
             <a:pPr lvl="4"/>
             <a:r>
-              <a:rPr lang="de-DE" smtClean="0"/>
+              <a:rPr lang="de-DE"/>
               <a:t>Fünfte Ebene</a:t>
             </a:r>
             <a:endParaRPr lang="de-DE" dirty="0"/>
@@ -262,7 +277,7 @@
               <a:buNone/>
             </a:pPr>
             <a:r>
-              <a:rPr lang="de-DE" smtClean="0"/>
+              <a:rPr lang="de-DE"/>
               <a:t>Master-Untertitelformat bearbeiten</a:t>
             </a:r>
             <a:endParaRPr lang="de-DE" dirty="0"/>
@@ -378,35 +393,35 @@
           <a:p>
             <a:pPr lvl="0"/>
             <a:r>
-              <a:rPr lang="de-DE" smtClean="0"/>
+              <a:rPr lang="de-DE"/>
               <a:t>Mastertextformat bearbeiten</a:t>
             </a:r>
           </a:p>
           <a:p>
             <a:pPr lvl="1"/>
             <a:r>
-              <a:rPr lang="de-DE" smtClean="0"/>
+              <a:rPr lang="de-DE"/>
               <a:t>Zweite Ebene</a:t>
             </a:r>
           </a:p>
           <a:p>
             <a:pPr lvl="2"/>
             <a:r>
-              <a:rPr lang="de-DE" smtClean="0"/>
+              <a:rPr lang="de-DE"/>
               <a:t>Dritte Ebene</a:t>
             </a:r>
           </a:p>
           <a:p>
             <a:pPr lvl="3"/>
             <a:r>
-              <a:rPr lang="de-DE" smtClean="0"/>
+              <a:rPr lang="de-DE"/>
               <a:t>Vierte Ebene</a:t>
             </a:r>
           </a:p>
           <a:p>
             <a:pPr lvl="4"/>
             <a:r>
-              <a:rPr lang="de-DE" smtClean="0"/>
+              <a:rPr lang="de-DE"/>
               <a:t>Fünfte Ebene</a:t>
             </a:r>
             <a:endParaRPr lang="de-DE" dirty="0"/>
@@ -436,7 +451,7 @@
           <a:lstStyle/>
           <a:p>
             <a:r>
-              <a:rPr lang="de-DE" sz="2400" dirty="0" smtClean="0">
+              <a:rPr lang="de-DE" sz="2400" dirty="0">
                 <a:solidFill>
                   <a:srgbClr val="7E006B"/>
                 </a:solidFill>
@@ -446,7 +461,7 @@
               <a:t>TRAININGS</a:t>
             </a:r>
             <a:r>
-              <a:rPr lang="de-DE" sz="2400" dirty="0" smtClean="0">
+              <a:rPr lang="de-DE" sz="2400" dirty="0">
                 <a:solidFill>
                   <a:srgbClr val="7E006B"/>
                 </a:solidFill>
@@ -497,14 +512,20 @@
       </p:pic>
       <p:sp>
         <p:nvSpPr>
-          <p:cNvPr id="5" name="Shape 7"/>
+          <p:cNvPr id="4" name="Shape 7">
+            <a:extLst>
+              <a:ext uri="{FF2B5EF4-FFF2-40B4-BE49-F238E27FC236}">
+                <a16:creationId xmlns:a16="http://schemas.microsoft.com/office/drawing/2014/main" id="{E604DD9F-1003-9E03-1E24-BAEB2ADBFC57}"/>
+              </a:ext>
+            </a:extLst>
+          </p:cNvPr>
           <p:cNvSpPr/>
           <p:nvPr userDrawn="1"/>
         </p:nvSpPr>
         <p:spPr>
           <a:xfrm>
-            <a:off x="1683417" y="4952581"/>
-            <a:ext cx="4196016" cy="276995"/>
+            <a:off x="971550" y="4689585"/>
+            <a:ext cx="4691860" cy="461661"/>
           </a:xfrm>
           <a:prstGeom prst="rect">
             <a:avLst/>
@@ -514,12 +535,12 @@
           </a:ln>
           <a:extLst>
             <a:ext uri="{C572A759-6A51-4108-AA02-DFA0A04FC94B}">
-              <ma14:wrappingTextBoxFlag xmlns:ma14="http://schemas.microsoft.com/office/mac/drawingml/2011/main" val="1"/>
+              <ma14:wrappingTextBoxFlag xmlns="" xmlns:ma14="http://schemas.microsoft.com/office/mac/drawingml/2011/main" val="1"/>
             </a:ext>
           </a:extLst>
         </p:spPr>
         <p:txBody>
-          <a:bodyPr wrap="none" lIns="45718" tIns="45718" rIns="45718" bIns="45718">
+          <a:bodyPr wrap="square" lIns="45718" tIns="45718" rIns="45718" bIns="45718">
             <a:spAutoFit/>
           </a:bodyPr>
           <a:lstStyle/>
@@ -528,49 +549,266 @@
               <a:defRPr sz="1800"/>
             </a:pPr>
             <a:r>
-              <a:rPr sz="600" dirty="0">
-                <a:latin typeface="Avenir Light"/>
+              <a:rPr lang="de-DE" sz="800" b="0" i="0" u="none" strike="noStrike" dirty="0" err="1">
+                <a:solidFill>
+                  <a:schemeClr val="tx1">
+                    <a:lumMod val="65000"/>
+                    <a:lumOff val="35000"/>
+                  </a:schemeClr>
+                </a:solidFill>
+                <a:effectLst/>
+                <a:latin typeface="Avenir Book" panose="02000503020000020003" pitchFamily="2" charset="0"/>
+              </a:rPr>
+              <a:t>music</a:t>
+            </a:r>
+            <a:r>
+              <a:rPr lang="de-DE" sz="800" b="0" i="0" u="none" strike="noStrike" dirty="0">
+                <a:solidFill>
+                  <a:schemeClr val="tx1">
+                    <a:lumMod val="65000"/>
+                    <a:lumOff val="35000"/>
+                  </a:schemeClr>
+                </a:solidFill>
+                <a:effectLst/>
+                <a:latin typeface="Avenir Book" panose="02000503020000020003" pitchFamily="2" charset="0"/>
+              </a:rPr>
+              <a:t> </a:t>
+            </a:r>
+            <a:r>
+              <a:rPr lang="de-DE" sz="800" b="0" i="0" u="none" strike="noStrike" dirty="0" err="1">
+                <a:solidFill>
+                  <a:schemeClr val="tx1">
+                    <a:lumMod val="65000"/>
+                    <a:lumOff val="35000"/>
+                  </a:schemeClr>
+                </a:solidFill>
+                <a:effectLst/>
+                <a:latin typeface="Avenir Book" panose="02000503020000020003" pitchFamily="2" charset="0"/>
+              </a:rPr>
+              <a:t>moves</a:t>
+            </a:r>
+            <a:r>
+              <a:rPr lang="de-DE" sz="800" b="0" i="0" u="none" strike="noStrike" dirty="0">
+                <a:solidFill>
+                  <a:schemeClr val="tx1">
+                    <a:lumMod val="65000"/>
+                    <a:lumOff val="35000"/>
+                  </a:schemeClr>
+                </a:solidFill>
+                <a:effectLst/>
+                <a:latin typeface="Avenir Book" panose="02000503020000020003" pitchFamily="2" charset="0"/>
+              </a:rPr>
+              <a:t>-Trainingskarten von Regina Brandhuber sind lizenziert unter einer Creative Commons </a:t>
+            </a:r>
+          </a:p>
+          <a:p>
+            <a:pPr lvl="0" algn="ctr">
+              <a:defRPr sz="1800"/>
+            </a:pPr>
+            <a:r>
+              <a:rPr lang="de-DE" sz="800" b="0" i="0" u="none" strike="noStrike" dirty="0">
+                <a:solidFill>
+                  <a:schemeClr val="tx1">
+                    <a:lumMod val="65000"/>
+                    <a:lumOff val="35000"/>
+                  </a:schemeClr>
+                </a:solidFill>
+                <a:effectLst/>
+                <a:latin typeface="Avenir Book" panose="02000503020000020003" pitchFamily="2" charset="0"/>
+              </a:rPr>
+              <a:t>Namensnennung-Nicht kommerziell 4.0 International Lizenz.</a:t>
+            </a:r>
+          </a:p>
+          <a:p>
+            <a:pPr lvl="0" algn="ctr">
+              <a:defRPr sz="1800"/>
+            </a:pPr>
+            <a:r>
+              <a:rPr lang="de-DE" sz="800" dirty="0">
+                <a:solidFill>
+                  <a:schemeClr val="tx1">
+                    <a:lumMod val="65000"/>
+                    <a:lumOff val="35000"/>
+                  </a:schemeClr>
+                </a:solidFill>
+                <a:latin typeface="Avenir Book" panose="02000503020000020003" pitchFamily="2" charset="0"/>
                 <a:ea typeface="Calibri"/>
                 <a:cs typeface="Avenir Light"/>
                 <a:sym typeface="Calibri"/>
               </a:rPr>
-              <a:t>This work is licensed under the Creative Commons Attribution-NonCommercial-NoDerivatives 4.0 International License. </a:t>
-            </a:r>
-          </a:p>
-          <a:p>
-            <a:pPr lvl="0" algn="ctr">
-              <a:defRPr sz="1800"/>
-            </a:pPr>
-            <a:r>
-              <a:rPr sz="600" dirty="0">
-                <a:latin typeface="Avenir Light"/>
+              <a:t>Nachzulesen unter:</a:t>
+            </a:r>
+            <a:r>
+              <a:rPr sz="800" dirty="0">
+                <a:solidFill>
+                  <a:schemeClr val="tx1">
+                    <a:lumMod val="65000"/>
+                    <a:lumOff val="35000"/>
+                  </a:schemeClr>
+                </a:solidFill>
+                <a:latin typeface="Avenir Book" panose="02000503020000020003" pitchFamily="2" charset="0"/>
                 <a:ea typeface="Calibri"/>
                 <a:cs typeface="Avenir Light"/>
                 <a:sym typeface="Calibri"/>
               </a:rPr>
-              <a:t>To view a copy of this license, visit http://creativecommons.org/licenses/by-nc-nd/4.0/.</a:t>
-            </a:r>
+              <a:t> </a:t>
+            </a:r>
+            <a:r>
+              <a:rPr lang="de-DE" sz="800" dirty="0">
+                <a:solidFill>
+                  <a:schemeClr val="tx1">
+                    <a:lumMod val="65000"/>
+                    <a:lumOff val="35000"/>
+                  </a:schemeClr>
+                </a:solidFill>
+                <a:latin typeface="Avenir Book" panose="02000503020000020003" pitchFamily="2" charset="0"/>
+                <a:ea typeface="Calibri"/>
+                <a:cs typeface="Avenir Light"/>
+                <a:sym typeface="Calibri"/>
+              </a:rPr>
+              <a:t>https://</a:t>
+            </a:r>
+            <a:r>
+              <a:rPr lang="de-DE" sz="800" dirty="0" err="1">
+                <a:solidFill>
+                  <a:schemeClr val="tx1">
+                    <a:lumMod val="65000"/>
+                    <a:lumOff val="35000"/>
+                  </a:schemeClr>
+                </a:solidFill>
+                <a:latin typeface="Avenir Book" panose="02000503020000020003" pitchFamily="2" charset="0"/>
+                <a:ea typeface="Calibri"/>
+                <a:cs typeface="Avenir Light"/>
+                <a:sym typeface="Calibri"/>
+              </a:rPr>
+              <a:t>creativecommons.org</a:t>
+            </a:r>
+            <a:r>
+              <a:rPr lang="de-DE" sz="800" dirty="0">
+                <a:solidFill>
+                  <a:schemeClr val="tx1">
+                    <a:lumMod val="65000"/>
+                    <a:lumOff val="35000"/>
+                  </a:schemeClr>
+                </a:solidFill>
+                <a:latin typeface="Avenir Book" panose="02000503020000020003" pitchFamily="2" charset="0"/>
+                <a:ea typeface="Calibri"/>
+                <a:cs typeface="Avenir Light"/>
+                <a:sym typeface="Calibri"/>
+              </a:rPr>
+              <a:t>/</a:t>
+            </a:r>
+            <a:r>
+              <a:rPr lang="de-DE" sz="800" dirty="0" err="1">
+                <a:solidFill>
+                  <a:schemeClr val="tx1">
+                    <a:lumMod val="65000"/>
+                    <a:lumOff val="35000"/>
+                  </a:schemeClr>
+                </a:solidFill>
+                <a:latin typeface="Avenir Book" panose="02000503020000020003" pitchFamily="2" charset="0"/>
+                <a:ea typeface="Calibri"/>
+                <a:cs typeface="Avenir Light"/>
+                <a:sym typeface="Calibri"/>
+              </a:rPr>
+              <a:t>licenses</a:t>
+            </a:r>
+            <a:r>
+              <a:rPr lang="de-DE" sz="800" dirty="0">
+                <a:solidFill>
+                  <a:schemeClr val="tx1">
+                    <a:lumMod val="65000"/>
+                    <a:lumOff val="35000"/>
+                  </a:schemeClr>
+                </a:solidFill>
+                <a:latin typeface="Avenir Book" panose="02000503020000020003" pitchFamily="2" charset="0"/>
+                <a:ea typeface="Calibri"/>
+                <a:cs typeface="Avenir Light"/>
+                <a:sym typeface="Calibri"/>
+              </a:rPr>
+              <a:t>/</a:t>
+            </a:r>
+            <a:r>
+              <a:rPr lang="de-DE" sz="800" dirty="0" err="1">
+                <a:solidFill>
+                  <a:schemeClr val="tx1">
+                    <a:lumMod val="65000"/>
+                    <a:lumOff val="35000"/>
+                  </a:schemeClr>
+                </a:solidFill>
+                <a:latin typeface="Avenir Book" panose="02000503020000020003" pitchFamily="2" charset="0"/>
+                <a:ea typeface="Calibri"/>
+                <a:cs typeface="Avenir Light"/>
+                <a:sym typeface="Calibri"/>
+              </a:rPr>
+              <a:t>by-nc</a:t>
+            </a:r>
+            <a:r>
+              <a:rPr lang="de-DE" sz="800" dirty="0">
+                <a:solidFill>
+                  <a:schemeClr val="tx1">
+                    <a:lumMod val="65000"/>
+                    <a:lumOff val="35000"/>
+                  </a:schemeClr>
+                </a:solidFill>
+                <a:latin typeface="Avenir Book" panose="02000503020000020003" pitchFamily="2" charset="0"/>
+                <a:ea typeface="Calibri"/>
+                <a:cs typeface="Avenir Light"/>
+                <a:sym typeface="Calibri"/>
+              </a:rPr>
+              <a:t>/4.0/</a:t>
+            </a:r>
+            <a:r>
+              <a:rPr lang="de-DE" sz="800" dirty="0" err="1">
+                <a:solidFill>
+                  <a:schemeClr val="tx1">
+                    <a:lumMod val="65000"/>
+                    <a:lumOff val="35000"/>
+                  </a:schemeClr>
+                </a:solidFill>
+                <a:latin typeface="Avenir Book" panose="02000503020000020003" pitchFamily="2" charset="0"/>
+                <a:ea typeface="Calibri"/>
+                <a:cs typeface="Avenir Light"/>
+                <a:sym typeface="Calibri"/>
+              </a:rPr>
+              <a:t>deed.de</a:t>
+            </a:r>
+            <a:endParaRPr sz="800" dirty="0">
+              <a:solidFill>
+                <a:schemeClr val="tx1">
+                  <a:lumMod val="65000"/>
+                  <a:lumOff val="35000"/>
+                </a:schemeClr>
+              </a:solidFill>
+              <a:latin typeface="Avenir Book" panose="02000503020000020003" pitchFamily="2" charset="0"/>
+              <a:ea typeface="Calibri"/>
+              <a:cs typeface="Avenir Light"/>
+              <a:sym typeface="Calibri"/>
+            </a:endParaRPr>
           </a:p>
         </p:txBody>
       </p:sp>
       <p:pic>
         <p:nvPicPr>
-          <p:cNvPr id="6" name="pasted-image.tif"/>
+          <p:cNvPr id="8" name="pasted-image.tif">
+            <a:extLst>
+              <a:ext uri="{FF2B5EF4-FFF2-40B4-BE49-F238E27FC236}">
+                <a16:creationId xmlns:a16="http://schemas.microsoft.com/office/drawing/2014/main" id="{F144E761-819B-52AE-BE7E-D048CAF08611}"/>
+              </a:ext>
+            </a:extLst>
+          </p:cNvPr>
           <p:cNvPicPr/>
           <p:nvPr userDrawn="1"/>
         </p:nvPicPr>
-        <p:blipFill>
-          <a:blip r:embed="rId4">
-            <a:extLst/>
-          </a:blip>
-          <a:stretch>
-            <a:fillRect/>
-          </a:stretch>
+        <p:blipFill rotWithShape="1">
+          <a:blip r:embed="rId4"/>
+          <a:srcRect r="24777" b="-3233"/>
+          <a:stretch/>
         </p:blipFill>
         <p:spPr>
           <a:xfrm>
-            <a:off x="6174185" y="4992838"/>
-            <a:ext cx="886619" cy="214128"/>
+            <a:off x="5724347" y="4733926"/>
+            <a:ext cx="1009828" cy="333374"/>
           </a:xfrm>
           <a:prstGeom prst="rect">
             <a:avLst/>
@@ -580,58 +818,6 @@
           </a:ln>
         </p:spPr>
       </p:pic>
-      <p:sp>
-        <p:nvSpPr>
-          <p:cNvPr id="7" name="Textfeld 6"/>
-          <p:cNvSpPr txBox="1"/>
-          <p:nvPr userDrawn="1"/>
-        </p:nvSpPr>
-        <p:spPr>
-          <a:xfrm>
-            <a:off x="239285" y="4936890"/>
-            <a:ext cx="1044856" cy="276999"/>
-          </a:xfrm>
-          <a:prstGeom prst="rect">
-            <a:avLst/>
-          </a:prstGeom>
-          <a:noFill/>
-        </p:spPr>
-        <p:txBody>
-          <a:bodyPr wrap="square" rtlCol="0">
-            <a:spAutoFit/>
-          </a:bodyPr>
-          <a:lstStyle/>
-          <a:p>
-            <a:r>
-              <a:rPr lang="de-DE" sz="600" dirty="0">
-                <a:solidFill>
-                  <a:srgbClr val="5D5E5F"/>
-                </a:solidFill>
-                <a:latin typeface="Avenir Light"/>
-                <a:cs typeface="Avenir Light"/>
-              </a:rPr>
-              <a:t>Letzte Änderung: </a:t>
-            </a:r>
-            <a:fld id="{7A8C7DAC-E536-564C-B5B3-90E8FAB50562}" type="datetime1">
-              <a:rPr lang="de-DE" sz="600" smtClean="0">
-                <a:solidFill>
-                  <a:srgbClr val="5D5E5F"/>
-                </a:solidFill>
-                <a:latin typeface="Avenir Light"/>
-                <a:cs typeface="Avenir Light"/>
-              </a:rPr>
-              <a:t>24.01.16</a:t>
-            </a:fld>
-            <a:endParaRPr lang="de-DE" sz="600" dirty="0">
-              <a:solidFill>
-                <a:srgbClr val="5D5E5F"/>
-              </a:solidFill>
-              <a:latin typeface="Avenir Light"/>
-              <a:cs typeface="Avenir Light"/>
-            </a:endParaRPr>
-          </a:p>
-        </p:txBody>
-      </p:sp>
     </p:spTree>
     <p:extLst>
       <p:ext uri="{BB962C8B-B14F-4D97-AF65-F5344CB8AC3E}">
@@ -678,10 +864,9 @@
           <a:lstStyle/>
           <a:p>
             <a:r>
-              <a:rPr lang="de-DE" smtClean="0"/>
+              <a:rPr lang="de-DE"/>
               <a:t>Mastertitelformat bearbeiten</a:t>
             </a:r>
-            <a:endParaRPr lang="de-DE"/>
           </a:p>
         </p:txBody>
       </p:sp>
@@ -702,7 +887,7 @@
           <a:p>
             <a:fld id="{FF5B2BAF-DF38-0A48-A798-0C06E514FD52}" type="datetimeFigureOut">
               <a:rPr lang="de-DE" smtClean="0"/>
-              <a:t>24.01.16</a:t>
+              <a:t>25.07.23</a:t>
             </a:fld>
             <a:endParaRPr lang="de-DE" dirty="0"/>
           </a:p>
@@ -813,17 +998,16 @@
           <a:p>
             <a:pPr marL="0" lvl="0" algn="l"/>
             <a:r>
-              <a:rPr lang="de-DE" dirty="0" smtClean="0"/>
+              <a:rPr lang="de-DE" dirty="0"/>
               <a:t>Überschrift </a:t>
             </a:r>
             <a:br>
-              <a:rPr lang="de-DE" dirty="0" smtClean="0"/>
+              <a:rPr lang="de-DE" dirty="0"/>
             </a:br>
             <a:r>
-              <a:rPr lang="de-DE" dirty="0" smtClean="0"/>
+              <a:rPr lang="de-DE" dirty="0"/>
               <a:t>bearbeiten </a:t>
             </a:r>
-            <a:endParaRPr lang="de-DE" dirty="0"/>
           </a:p>
         </p:txBody>
       </p:sp>
@@ -854,38 +1038,37 @@
           <a:p>
             <a:pPr lvl="0"/>
             <a:r>
-              <a:rPr lang="de-DE" dirty="0" smtClean="0"/>
+              <a:rPr lang="de-DE" dirty="0"/>
               <a:t>Mastertextformat bearbeiten</a:t>
             </a:r>
           </a:p>
           <a:p>
             <a:pPr lvl="1"/>
             <a:r>
-              <a:rPr lang="de-DE" dirty="0" smtClean="0"/>
+              <a:rPr lang="de-DE" dirty="0"/>
               <a:t>Zweite Ebene</a:t>
             </a:r>
           </a:p>
           <a:p>
             <a:pPr lvl="2"/>
             <a:r>
-              <a:rPr lang="de-DE" dirty="0" smtClean="0"/>
+              <a:rPr lang="de-DE" dirty="0"/>
               <a:t>Dritte Ebene</a:t>
             </a:r>
           </a:p>
           <a:p>
             <a:pPr lvl="3"/>
             <a:r>
-              <a:rPr lang="de-DE" dirty="0" smtClean="0"/>
+              <a:rPr lang="de-DE" dirty="0"/>
               <a:t>Vierte Ebene</a:t>
             </a:r>
           </a:p>
           <a:p>
             <a:pPr lvl="4"/>
             <a:r>
-              <a:rPr lang="de-DE" dirty="0" smtClean="0"/>
+              <a:rPr lang="de-DE" dirty="0"/>
               <a:t>Fünfte Ebene</a:t>
             </a:r>
-            <a:endParaRPr lang="de-DE" dirty="0"/>
           </a:p>
         </p:txBody>
       </p:sp>
@@ -924,7 +1107,7 @@
           <a:p>
             <a:fld id="{FF5B2BAF-DF38-0A48-A798-0C06E514FD52}" type="datetimeFigureOut">
               <a:rPr lang="de-DE" smtClean="0"/>
-              <a:t>24.01.16</a:t>
+              <a:t>25.07.23</a:t>
             </a:fld>
             <a:endParaRPr lang="de-DE" dirty="0"/>
           </a:p>
@@ -1158,7 +1341,7 @@
           <a:lstStyle/>
           <a:p>
             <a:r>
-              <a:rPr lang="de-DE" sz="1050" b="1" dirty="0" smtClean="0">
+              <a:rPr lang="de-DE" sz="1050" b="1" dirty="0">
                 <a:solidFill>
                   <a:schemeClr val="bg1"/>
                 </a:solidFill>
@@ -1168,7 +1351,7 @@
               <a:t>TRAININGSKARTE</a:t>
             </a:r>
             <a:r>
-              <a:rPr lang="de-DE" sz="1050" dirty="0" smtClean="0">
+              <a:rPr lang="de-DE" sz="1050" dirty="0">
                 <a:solidFill>
                   <a:schemeClr val="bg1"/>
                 </a:solidFill>
@@ -1178,7 +1361,7 @@
               <a:t> </a:t>
             </a:r>
             <a:r>
-              <a:rPr lang="de-DE" sz="1050" b="1" dirty="0" smtClean="0">
+              <a:rPr lang="de-DE" sz="1050" b="1" dirty="0">
                 <a:solidFill>
                   <a:schemeClr val="bg1"/>
                 </a:solidFill>
@@ -1187,13 +1370,6 @@
               </a:rPr>
               <a:t>TCR 07</a:t>
             </a:r>
-            <a:endParaRPr lang="de-DE" sz="1050" b="1" dirty="0">
-              <a:solidFill>
-                <a:schemeClr val="bg1"/>
-              </a:solidFill>
-              <a:latin typeface="Avenir Heavy"/>
-              <a:cs typeface="Avenir Heavy"/>
-            </a:endParaRPr>
           </a:p>
         </p:txBody>
       </p:sp>
@@ -1576,17 +1752,16 @@
           <a:lstStyle/>
           <a:p>
             <a:r>
-              <a:rPr lang="de-DE" dirty="0" smtClean="0">
+              <a:rPr lang="de-DE" dirty="0">
                 <a:latin typeface="Avenir Heavy"/>
                 <a:cs typeface="Avenir Heavy"/>
               </a:rPr>
               <a:t>FINALI</a:t>
             </a:r>
             <a:r>
-              <a:rPr lang="de-DE" dirty="0" smtClean="0"/>
+              <a:rPr lang="de-DE" dirty="0"/>
               <a:t>SIEREN</a:t>
             </a:r>
-            <a:endParaRPr lang="de-DE" dirty="0"/>
           </a:p>
         </p:txBody>
       </p:sp>
@@ -1612,24 +1787,12 @@
               <a:t>Durch Deine </a:t>
             </a:r>
             <a:r>
-              <a:rPr lang="de-DE" sz="1200" dirty="0" err="1" smtClean="0"/>
+              <a:rPr lang="de-DE" sz="1200" dirty="0" err="1"/>
               <a:t>Aspektesammlung</a:t>
             </a:r>
             <a:r>
-              <a:rPr lang="de-DE" sz="1200" dirty="0" smtClean="0"/>
-              <a:t> </a:t>
-            </a:r>
-            <a:r>
               <a:rPr lang="de-DE" sz="1200" dirty="0"/>
-              <a:t>hat sich nun ein Bild für Dein Training herausgebildet. Dein </a:t>
-            </a:r>
-            <a:r>
-              <a:rPr lang="de-DE" sz="1200" dirty="0" smtClean="0"/>
-              <a:t>Training </a:t>
-            </a:r>
-            <a:r>
-              <a:rPr lang="de-DE" sz="1200" dirty="0"/>
-              <a:t>erweitert dieses Bild. </a:t>
+              <a:t> hat sich nun ein Bild für Dein Training herausgebildet. Dein Training erweitert dieses Bild. </a:t>
             </a:r>
           </a:p>
           <a:p>
@@ -1647,7 +1810,7 @@
           <a:p>
             <a:r>
               <a:rPr lang="de-DE" sz="1200" dirty="0"/>
-              <a:t>oder Du entscheidest Dich einfach nur um, etwas anders zu machen, weil Du denkst, dass es sinniger ist, als so wie Du es vorher gesehen hattest.</a:t>
+              <a:t>oder Du entscheidest Dich einfach nur um, etwas anders zu machen, weil Du denkst, dass es sinniger ist, als so wie Du es vorher gedacht hattest.</a:t>
             </a:r>
           </a:p>
           <a:p>
@@ -1659,15 +1822,78 @@
           <a:p>
             <a:r>
               <a:rPr lang="de-DE" sz="1200" dirty="0"/>
-              <a:t>Irgendwann ist dann der Punkt erreicht, wo Du Hunger auf die Ausformulierung Deiner Trainingskarte bekommst. Dann leg einfach los. </a:t>
+              <a:t>Irgendwann ist dann der Punkt erreicht, und die Ausformulierung Deiner Trainingskarte ist nur noch ein kleiner Schritt. </a:t>
             </a:r>
           </a:p>
           <a:p>
             <a:r>
               <a:rPr lang="de-DE" sz="1200" dirty="0"/>
-              <a:t>Die Rahmenbedingungen für die schriftliche Ausformulierung der Karte findest Du auf der Karte TRC 01.</a:t>
-            </a:r>
-            <a:endParaRPr lang="de-DE" sz="1200" dirty="0"/>
+              <a:t>Die Rahmenbedingungen für die schriftliche Ausformulierung und das professionelle Layout, das diese Karte hier hat, findest Du auf der Karte TRC 03 unter: https://</a:t>
+            </a:r>
+            <a:r>
+              <a:rPr lang="de-DE" sz="1200" dirty="0" err="1"/>
+              <a:t>github.com</a:t>
+            </a:r>
+            <a:r>
+              <a:rPr lang="de-DE" sz="1200" dirty="0"/>
+              <a:t>/</a:t>
+            </a:r>
+            <a:r>
+              <a:rPr lang="de-DE" sz="1200" dirty="0" err="1"/>
+              <a:t>Teamtool</a:t>
+            </a:r>
+            <a:r>
+              <a:rPr lang="de-DE" sz="1200" dirty="0"/>
+              <a:t>/</a:t>
+            </a:r>
+            <a:r>
+              <a:rPr lang="de-DE" sz="1200" dirty="0" err="1"/>
+              <a:t>training</a:t>
+            </a:r>
+            <a:r>
+              <a:rPr lang="de-DE" sz="1200" dirty="0"/>
+              <a:t>-materials/</a:t>
+            </a:r>
+            <a:r>
+              <a:rPr lang="de-DE" sz="1200" dirty="0" err="1"/>
+              <a:t>blob</a:t>
+            </a:r>
+            <a:r>
+              <a:rPr lang="de-DE" sz="1200" dirty="0"/>
+              <a:t>/</a:t>
+            </a:r>
+            <a:r>
+              <a:rPr lang="de-DE" sz="1200" dirty="0" err="1"/>
+              <a:t>master</a:t>
+            </a:r>
+            <a:r>
+              <a:rPr lang="de-DE" sz="1200" dirty="0"/>
+              <a:t>/</a:t>
+            </a:r>
+            <a:r>
+              <a:rPr lang="de-DE" sz="1200" dirty="0" err="1"/>
+              <a:t>training</a:t>
+            </a:r>
+            <a:r>
+              <a:rPr lang="de-DE" sz="1200" dirty="0"/>
+              <a:t>-cards/music%20moves/Training%20Cards%20(TRC)/</a:t>
+            </a:r>
+            <a:r>
+              <a:rPr lang="de-DE" sz="1200" dirty="0" err="1"/>
+              <a:t>ger</a:t>
+            </a:r>
+            <a:r>
+              <a:rPr lang="de-DE" sz="1200" dirty="0"/>
+              <a:t>/</a:t>
+            </a:r>
+            <a:r>
+              <a:rPr lang="de-DE" sz="1200" dirty="0" err="1"/>
+              <a:t>apprentice</a:t>
+            </a:r>
+            <a:r>
+              <a:rPr lang="de-DE" sz="1200" dirty="0"/>
+              <a:t>/ger_TRC_03_Trainingskarte_layouten_MM_A.pptx</a:t>
+            </a:r>
           </a:p>
         </p:txBody>
       </p:sp>
@@ -1690,10 +1916,9 @@
               <a:buNone/>
             </a:pPr>
             <a:r>
-              <a:rPr lang="de-DE" dirty="0" smtClean="0"/>
+              <a:rPr lang="de-DE" dirty="0"/>
               <a:t>Regina Brandhuber</a:t>
             </a:r>
-            <a:endParaRPr lang="de-DE" dirty="0"/>
           </a:p>
         </p:txBody>
       </p:sp>
@@ -1750,7 +1975,7 @@
           <a:p>
             <a:r>
               <a:rPr lang="de-DE" dirty="0"/>
-              <a:t>Für jede Variante (also für jede Erstellung einer Trainingskarte) hast du 2 Wochen Zeit, also insgesamt 4 Wochen. Natürlich kannst Du auch gleich 2 Trainingskarten parallel entstehen lassen und diese Karte zusammen mit den anderen verschränkten Karten innerhalb von 2 Wochen erledigen.</a:t>
+              <a:t>Für jede Variante (also für jede Erstellung einer Trainingskarte) hast du 2 Wochen Zeit, also insgesamt 4 Wochen. Natürlich kannst Du auch gleich 2 Trainingskarten parallel entstehen lassen und diese Karte zusammen mit den anderen Karten verschränkt innerhalb von 2 Wochen erledigen.</a:t>
             </a:r>
           </a:p>
           <a:p>
@@ -1764,47 +1989,26 @@
               <a:rPr lang="de-DE" dirty="0"/>
               <a:t>Gib Deiner Trainingskarte nach einer gewissen Zeit in eine finale Form, indem Du </a:t>
             </a:r>
-            <a:r>
-              <a:rPr lang="de-DE" dirty="0" smtClean="0"/>
-              <a:t/>
-            </a:r>
             <a:br>
-              <a:rPr lang="de-DE" dirty="0" smtClean="0"/>
+              <a:rPr lang="de-DE" dirty="0"/>
             </a:br>
             <a:r>
-              <a:rPr lang="de-DE" dirty="0" smtClean="0"/>
-              <a:t>alle </a:t>
-            </a:r>
-            <a:r>
               <a:rPr lang="de-DE" dirty="0"/>
-              <a:t>Aspekte ins Format einer Trainingskarte bringst.</a:t>
+              <a:t>alle Aspekte ins Format einer Trainingskarte bringst.</a:t>
             </a:r>
           </a:p>
           <a:p>
             <a:r>
               <a:rPr lang="de-DE" dirty="0"/>
-              <a:t>Diese Karte wird automatisch zertifiziert, sobald Dein Team Dir die verschränkte</a:t>
-            </a:r>
-            <a:r>
-              <a:rPr lang="de-DE"/>
-              <a:t> </a:t>
-            </a:r>
-            <a:r>
-              <a:rPr lang="de-DE" smtClean="0"/>
-              <a:t/>
+              <a:t>Diese Karte wird automatisch zertifiziert, sobald Dein Team Dir die Karte TRC 08 </a:t>
             </a:r>
             <a:br>
-              <a:rPr lang="de-DE" smtClean="0"/>
+              <a:rPr lang="de-DE" dirty="0"/>
             </a:br>
             <a:r>
-              <a:rPr lang="de-DE" smtClean="0"/>
-              <a:t>Karte</a:t>
-            </a:r>
-            <a:r>
               <a:rPr lang="de-DE" dirty="0"/>
-              <a:t> TRC 08 zertifiziert hat.</a:t>
-            </a:r>
-            <a:endParaRPr lang="de-DE" dirty="0"/>
+              <a:t>zertifiziert hat.</a:t>
+            </a:r>
           </a:p>
         </p:txBody>
       </p:sp>

</xml_diff>

<commit_message>
TCR 07, 08 und 02
überarbeitet, Blocksatz und Formulierung
</commit_message>
<xml_diff>
--- a/training-cards/music moves/Training Cards (TRC)/ger/apprentice/ger_TCR_07_Finalisieren_MM_A.pptx
+++ b/training-cards/music moves/Training Cards (TRC)/ger/apprentice/ger_TCR_07_Finalisieren_MM_A.pptx
@@ -887,7 +887,7 @@
           <a:p>
             <a:fld id="{FF5B2BAF-DF38-0A48-A798-0C06E514FD52}" type="datetimeFigureOut">
               <a:rPr lang="de-DE" smtClean="0"/>
-              <a:t>25.07.23</a:t>
+              <a:t>25.10.25</a:t>
             </a:fld>
             <a:endParaRPr lang="de-DE" dirty="0"/>
           </a:p>
@@ -1107,7 +1107,7 @@
           <a:p>
             <a:fld id="{FF5B2BAF-DF38-0A48-A798-0C06E514FD52}" type="datetimeFigureOut">
               <a:rPr lang="de-DE" smtClean="0"/>
-              <a:t>25.07.23</a:t>
+              <a:t>25.10.25</a:t>
             </a:fld>
             <a:endParaRPr lang="de-DE" dirty="0"/>
           </a:p>
@@ -1775,13 +1775,19 @@
             <p:ph idx="13"/>
           </p:nvPr>
         </p:nvSpPr>
-        <p:spPr/>
+        <p:spPr>
+          <a:xfrm>
+            <a:off x="858838" y="1568452"/>
+            <a:ext cx="6011545" cy="3418415"/>
+          </a:xfrm>
+        </p:spPr>
         <p:txBody>
           <a:bodyPr>
             <a:noAutofit/>
           </a:bodyPr>
           <a:lstStyle/>
           <a:p>
+            <a:pPr algn="just"/>
             <a:r>
               <a:rPr lang="de-DE" sz="1200" dirty="0"/>
               <a:t>Durch Deine </a:t>
@@ -1792,59 +1798,56 @@
             </a:r>
             <a:r>
               <a:rPr lang="de-DE" sz="1200" dirty="0"/>
-              <a:t> hat sich nun ein Bild für Dein Training herausgebildet. Dein Training erweitert dieses Bild. </a:t>
-            </a:r>
-          </a:p>
-          <a:p>
+              <a:t> mit TCR 06 hast DU nun ein Bild für Dein Training herausgearbeitet. Dein Training erweitert dieses Bild. </a:t>
+            </a:r>
+          </a:p>
+          <a:p>
+            <a:pPr algn="just"/>
             <a:r>
               <a:rPr lang="de-DE" sz="1200" dirty="0"/>
               <a:t>Manchmal tauchen im Tun sogar Dinge auf, die Du bisher nicht auf der Rechnung hattest, </a:t>
             </a:r>
           </a:p>
           <a:p>
+            <a:pPr algn="just"/>
             <a:r>
               <a:rPr lang="de-DE" sz="1200" dirty="0"/>
               <a:t>die zum Teil dem widersprechen, was Du bisher zusammengetragen hast </a:t>
             </a:r>
           </a:p>
           <a:p>
+            <a:pPr algn="just"/>
             <a:r>
               <a:rPr lang="de-DE" sz="1200" dirty="0"/>
               <a:t>oder Du entscheidest Dich einfach nur um, etwas anders zu machen, weil Du denkst, dass es sinniger ist, als so wie Du es vorher gedacht hattest.</a:t>
             </a:r>
           </a:p>
           <a:p>
+            <a:pPr algn="just"/>
             <a:r>
               <a:rPr lang="de-DE" sz="1200" dirty="0"/>
-              <a:t>In dieser Phase Deines Trainings verfeinerst Du die Karte. Z. B. immer wenn Du Dein Training dokumentierst, bekommt die Trainingskarte einen Feinschliff. </a:t>
-            </a:r>
-          </a:p>
-          <a:p>
+              <a:t>In dieser Phase Deines Trainings verfeinerst Du die Karte. Z. B. immer, wenn Du Dein Training dokumentierst, bekommt die Trainingskarte einen Feinschliff. </a:t>
+            </a:r>
+          </a:p>
+          <a:p>
+            <a:pPr algn="just"/>
             <a:r>
               <a:rPr lang="de-DE" sz="1200" dirty="0"/>
               <a:t>Irgendwann ist dann der Punkt erreicht, und die Ausformulierung Deiner Trainingskarte ist nur noch ein kleiner Schritt. </a:t>
             </a:r>
           </a:p>
           <a:p>
+            <a:pPr algn="just"/>
             <a:r>
               <a:rPr lang="de-DE" sz="1200" dirty="0"/>
-              <a:t>Die Rahmenbedingungen für die schriftliche Ausformulierung und das professionelle Layout, das diese Karte hier hat, findest Du auf der Karte TRC 03 unter: https://</a:t>
-            </a:r>
-            <a:r>
-              <a:rPr lang="de-DE" sz="1200" dirty="0" err="1"/>
-              <a:t>github.com</a:t>
-            </a:r>
-            <a:r>
+              <a:t>Die Rahmenbedingungen für die schriftliche Ausformulierung und das professionelle Layout, das diese Karte hier hat, findest Du auf einem öffentlichen </a:t>
+            </a:r>
+            <a:br>
               <a:rPr lang="de-DE" sz="1200" dirty="0"/>
-              <a:t>/</a:t>
-            </a:r>
-            <a:r>
-              <a:rPr lang="de-DE" sz="1200" dirty="0" err="1"/>
-              <a:t>Teamtool</a:t>
-            </a:r>
+            </a:br>
             <a:r>
               <a:rPr lang="de-DE" sz="1200" dirty="0"/>
-              <a:t>/</a:t>
+              <a:t>Repositorium unter: https://github.com/Teamtool/training-materials/blob/master/ </a:t>
             </a:r>
             <a:r>
               <a:rPr lang="de-DE" sz="1200" dirty="0" err="1"/>
@@ -1852,48 +1855,27 @@
             </a:r>
             <a:r>
               <a:rPr lang="de-DE" sz="1200" dirty="0"/>
-              <a:t>-materials/</a:t>
+              <a:t>-cards/music%20moves/01_musicmoves_templates/</a:t>
             </a:r>
             <a:r>
               <a:rPr lang="de-DE" sz="1200" dirty="0" err="1"/>
-              <a:t>blob</a:t>
-            </a:r>
+              <a:t>Aufbau_einer_Karte</a:t>
+            </a:r>
+            <a:endParaRPr lang="de-DE" sz="1200" dirty="0"/>
+          </a:p>
+          <a:p>
+            <a:pPr marL="0" indent="0" algn="just">
+              <a:buNone/>
+            </a:pPr>
             <a:r>
               <a:rPr lang="de-DE" sz="1200" dirty="0"/>
-              <a:t>/</a:t>
+              <a:t>      .</a:t>
             </a:r>
             <a:r>
               <a:rPr lang="de-DE" sz="1200" dirty="0" err="1"/>
-              <a:t>master</a:t>
-            </a:r>
-            <a:r>
-              <a:rPr lang="de-DE" sz="1200" dirty="0"/>
-              <a:t>/</a:t>
-            </a:r>
-            <a:r>
-              <a:rPr lang="de-DE" sz="1200" dirty="0" err="1"/>
-              <a:t>training</a:t>
-            </a:r>
-            <a:r>
-              <a:rPr lang="de-DE" sz="1200" dirty="0"/>
-              <a:t>-cards/music%20moves/Training%20Cards%20(TRC)/</a:t>
-            </a:r>
-            <a:r>
-              <a:rPr lang="de-DE" sz="1200" dirty="0" err="1"/>
-              <a:t>ger</a:t>
-            </a:r>
-            <a:r>
-              <a:rPr lang="de-DE" sz="1200" dirty="0"/>
-              <a:t>/</a:t>
-            </a:r>
-            <a:r>
-              <a:rPr lang="de-DE" sz="1200" dirty="0" err="1"/>
-              <a:t>apprentice</a:t>
-            </a:r>
-            <a:r>
-              <a:rPr lang="de-DE" sz="1200" dirty="0"/>
-              <a:t>/ger_TRC_03_Trainingskarte_layouten_MM_A.pptx</a:t>
-            </a:r>
+              <a:t>pptx</a:t>
+            </a:r>
+            <a:endParaRPr lang="de-DE" sz="1200" dirty="0"/>
           </a:p>
         </p:txBody>
       </p:sp>
@@ -1967,34 +1949,38 @@
           <a:bodyPr/>
           <a:lstStyle/>
           <a:p>
+            <a:pPr algn="just"/>
             <a:r>
               <a:rPr lang="de-DE" dirty="0"/>
               <a:t>Trainiere diese Karte (insgesamt 2 Mal) direkt als Folgekarte nach TRC 06. Somit erlebst Du diesen Move in zwei verschiedenen Varianten.</a:t>
             </a:r>
           </a:p>
           <a:p>
+            <a:pPr algn="just"/>
             <a:r>
               <a:rPr lang="de-DE" dirty="0"/>
               <a:t>Für jede Variante (also für jede Erstellung einer Trainingskarte) hast du 2 Wochen Zeit, also insgesamt 4 Wochen. Natürlich kannst Du auch gleich 2 Trainingskarten parallel entstehen lassen und diese Karte zusammen mit den anderen Karten verschränkt innerhalb von 2 Wochen erledigen.</a:t>
             </a:r>
           </a:p>
           <a:p>
+            <a:pPr algn="just"/>
             <a:r>
               <a:rPr lang="de-DE" dirty="0"/>
               <a:t>Verfeinere insgesamt 2 Mal die gesammelten Aspekte Deiner Trainingskarte. </a:t>
             </a:r>
           </a:p>
           <a:p>
+            <a:pPr algn="just"/>
             <a:r>
               <a:rPr lang="de-DE" dirty="0"/>
-              <a:t>Gib Deiner Trainingskarte nach einer gewissen Zeit in eine finale Form, indem Du </a:t>
+              <a:t>Gib Deine Trainingskarte nach einer gewissen Zeit in eine finale Form, indem Du </a:t>
             </a:r>
             <a:br>
               <a:rPr lang="de-DE" dirty="0"/>
             </a:br>
             <a:r>
               <a:rPr lang="de-DE" dirty="0"/>
-              <a:t>alle Aspekte ins Format einer Trainingskarte bringst.</a:t>
+              <a:t>das Layout dieser Karte hier übernimmst oder andere ansprechende Formen findest.</a:t>
             </a:r>
           </a:p>
           <a:p>

</xml_diff>

<commit_message>
TRC 07 Link zum Trainingcards Template eingefügt
</commit_message>
<xml_diff>
--- a/training-cards/music moves/Training Cards (TRC)/ger/apprentice/ger_TCR_07_Finalisieren_MM_A.pptx
+++ b/training-cards/music moves/Training Cards (TRC)/ger/apprentice/ger_TCR_07_Finalisieren_MM_A.pptx
@@ -535,7 +535,7 @@
           </a:ln>
           <a:extLst>
             <a:ext uri="{C572A759-6A51-4108-AA02-DFA0A04FC94B}">
-              <ma14:wrappingTextBoxFlag xmlns="" xmlns:ma14="http://schemas.microsoft.com/office/mac/drawingml/2011/main" val="1"/>
+              <ma14:wrappingTextBoxFlag xmlns:ma14="http://schemas.microsoft.com/office/mac/drawingml/2011/main" xmlns="" val="1"/>
             </a:ext>
           </a:extLst>
         </p:spPr>
@@ -1777,7 +1777,7 @@
         </p:nvSpPr>
         <p:spPr>
           <a:xfrm>
-            <a:off x="858838" y="1568452"/>
+            <a:off x="833957" y="1445904"/>
             <a:ext cx="6011545" cy="3418415"/>
           </a:xfrm>
         </p:spPr>
@@ -1847,7 +1847,22 @@
             </a:br>
             <a:r>
               <a:rPr lang="de-DE" sz="1200" dirty="0"/>
-              <a:t>Repositorium unter: https://github.com/Teamtool/training-materials/blob/master/ </a:t>
+              <a:t>Repositorium unter: </a:t>
+            </a:r>
+          </a:p>
+          <a:p>
+            <a:pPr lvl="1" algn="just"/>
+            <a:r>
+              <a:rPr lang="de-DE" sz="1200" dirty="0"/>
+              <a:t>https://github.com/Teamtool/training-materials/blob/</a:t>
+            </a:r>
+            <a:r>
+              <a:rPr lang="de-DE" sz="1200" dirty="0" err="1"/>
+              <a:t>master</a:t>
+            </a:r>
+            <a:r>
+              <a:rPr lang="de-DE" sz="1200" dirty="0"/>
+              <a:t>/</a:t>
             </a:r>
             <a:r>
               <a:rPr lang="de-DE" sz="1200" dirty="0" err="1"/>
@@ -1855,25 +1870,23 @@
             </a:r>
             <a:r>
               <a:rPr lang="de-DE" sz="1200" dirty="0"/>
-              <a:t>-cards/music%20moves/01_musicmoves_templates/</a:t>
+              <a:t>-cards/ music%20moves/01_musicmoves_templates/</a:t>
             </a:r>
             <a:r>
               <a:rPr lang="de-DE" sz="1200" dirty="0" err="1"/>
-              <a:t>Aufbau_einer_Karte</a:t>
+              <a:t>Aufbau_einer_Karte.pptx</a:t>
             </a:r>
             <a:endParaRPr lang="de-DE" sz="1200" dirty="0"/>
           </a:p>
           <a:p>
-            <a:pPr marL="0" indent="0" algn="just">
-              <a:buNone/>
-            </a:pPr>
+            <a:pPr lvl="1" algn="just"/>
             <a:r>
               <a:rPr lang="de-DE" sz="1200" dirty="0"/>
-              <a:t>      .</a:t>
+              <a:t>https://github.com/Teamtool/training-materials/blob/master/training-cards /music%20moves/01_musicmoves_templates/</a:t>
             </a:r>
             <a:r>
               <a:rPr lang="de-DE" sz="1200" dirty="0" err="1"/>
-              <a:t>pptx</a:t>
+              <a:t>Aufbau_einer_Karte.pptx</a:t>
             </a:r>
             <a:endParaRPr lang="de-DE" sz="1200" dirty="0"/>
           </a:p>

</xml_diff>